<commit_message>
creation de fenêtre infos plus et liaison des tous les personnages
</commit_message>
<xml_diff>
--- a/Présentation PP.pptx
+++ b/Présentation PP.pptx
@@ -247,7 +247,7 @@
           <a:p>
             <a:fld id="{735EC88F-6CF8-4911-B764-5B0306CAC496}" type="datetimeFigureOut">
               <a:rPr lang="en-US" smtClean="0"/>
-              <a:t>4/23/2025</a:t>
+              <a:t>6/2/2025</a:t>
             </a:fld>
             <a:endParaRPr lang="en-US" dirty="0"/>
           </a:p>
@@ -417,7 +417,7 @@
           <a:p>
             <a:fld id="{735EC88F-6CF8-4911-B764-5B0306CAC496}" type="datetimeFigureOut">
               <a:rPr lang="en-US" smtClean="0"/>
-              <a:t>4/23/2025</a:t>
+              <a:t>6/2/2025</a:t>
             </a:fld>
             <a:endParaRPr lang="en-US" dirty="0"/>
           </a:p>
@@ -597,7 +597,7 @@
           <a:p>
             <a:fld id="{735EC88F-6CF8-4911-B764-5B0306CAC496}" type="datetimeFigureOut">
               <a:rPr lang="en-US" smtClean="0"/>
-              <a:t>4/23/2025</a:t>
+              <a:t>6/2/2025</a:t>
             </a:fld>
             <a:endParaRPr lang="en-US" dirty="0"/>
           </a:p>
@@ -767,7 +767,7 @@
           <a:p>
             <a:fld id="{735EC88F-6CF8-4911-B764-5B0306CAC496}" type="datetimeFigureOut">
               <a:rPr lang="en-US" smtClean="0"/>
-              <a:t>4/23/2025</a:t>
+              <a:t>6/2/2025</a:t>
             </a:fld>
             <a:endParaRPr lang="en-US" dirty="0"/>
           </a:p>
@@ -1013,7 +1013,7 @@
           <a:p>
             <a:fld id="{735EC88F-6CF8-4911-B764-5B0306CAC496}" type="datetimeFigureOut">
               <a:rPr lang="en-US" smtClean="0"/>
-              <a:t>4/23/2025</a:t>
+              <a:t>6/2/2025</a:t>
             </a:fld>
             <a:endParaRPr lang="en-US" dirty="0"/>
           </a:p>
@@ -1245,7 +1245,7 @@
           <a:p>
             <a:fld id="{735EC88F-6CF8-4911-B764-5B0306CAC496}" type="datetimeFigureOut">
               <a:rPr lang="en-US" smtClean="0"/>
-              <a:t>4/23/2025</a:t>
+              <a:t>6/2/2025</a:t>
             </a:fld>
             <a:endParaRPr lang="en-US" dirty="0"/>
           </a:p>
@@ -1612,7 +1612,7 @@
           <a:p>
             <a:fld id="{735EC88F-6CF8-4911-B764-5B0306CAC496}" type="datetimeFigureOut">
               <a:rPr lang="en-US" smtClean="0"/>
-              <a:t>4/23/2025</a:t>
+              <a:t>6/2/2025</a:t>
             </a:fld>
             <a:endParaRPr lang="en-US" dirty="0"/>
           </a:p>
@@ -1730,7 +1730,7 @@
           <a:p>
             <a:fld id="{735EC88F-6CF8-4911-B764-5B0306CAC496}" type="datetimeFigureOut">
               <a:rPr lang="en-US" smtClean="0"/>
-              <a:t>4/23/2025</a:t>
+              <a:t>6/2/2025</a:t>
             </a:fld>
             <a:endParaRPr lang="en-US" dirty="0"/>
           </a:p>
@@ -1825,7 +1825,7 @@
           <a:p>
             <a:fld id="{735EC88F-6CF8-4911-B764-5B0306CAC496}" type="datetimeFigureOut">
               <a:rPr lang="en-US" smtClean="0"/>
-              <a:t>4/23/2025</a:t>
+              <a:t>6/2/2025</a:t>
             </a:fld>
             <a:endParaRPr lang="en-US" dirty="0"/>
           </a:p>
@@ -2102,7 +2102,7 @@
           <a:p>
             <a:fld id="{735EC88F-6CF8-4911-B764-5B0306CAC496}" type="datetimeFigureOut">
               <a:rPr lang="en-US" smtClean="0"/>
-              <a:t>4/23/2025</a:t>
+              <a:t>6/2/2025</a:t>
             </a:fld>
             <a:endParaRPr lang="en-US" dirty="0"/>
           </a:p>
@@ -2355,7 +2355,7 @@
           <a:p>
             <a:fld id="{735EC88F-6CF8-4911-B764-5B0306CAC496}" type="datetimeFigureOut">
               <a:rPr lang="en-US" smtClean="0"/>
-              <a:t>4/23/2025</a:t>
+              <a:t>6/2/2025</a:t>
             </a:fld>
             <a:endParaRPr lang="en-US" dirty="0"/>
           </a:p>
@@ -2568,7 +2568,7 @@
           <a:p>
             <a:fld id="{735EC88F-6CF8-4911-B764-5B0306CAC496}" type="datetimeFigureOut">
               <a:rPr lang="en-US" smtClean="0"/>
-              <a:t>4/23/2025</a:t>
+              <a:t>6/2/2025</a:t>
             </a:fld>
             <a:endParaRPr lang="en-US" dirty="0"/>
           </a:p>
@@ -3523,7 +3523,7 @@
         <p:spPr>
           <a:xfrm>
             <a:off x="2756263" y="1107289"/>
-            <a:ext cx="6620980" cy="3231654"/>
+            <a:ext cx="6862520" cy="3231654"/>
           </a:xfrm>
           <a:prstGeom prst="rect">
             <a:avLst/>
@@ -3552,8 +3552,13 @@
             </a:pPr>
             <a:r>
               <a:rPr lang="fr-FR" sz="2000" dirty="0" smtClean="0"/>
-              <a:t>A propos de l’arbre généalogique</a:t>
-            </a:r>
+              <a:t>A propos </a:t>
+            </a:r>
+            <a:r>
+              <a:rPr lang="fr-FR" sz="2000" dirty="0" smtClean="0"/>
+              <a:t>du projet</a:t>
+            </a:r>
+            <a:endParaRPr lang="fr-FR" sz="2000" dirty="0" smtClean="0"/>
           </a:p>
           <a:p>
             <a:pPr lvl="1"/>
@@ -3576,7 +3581,15 @@
             </a:pPr>
             <a:r>
               <a:rPr lang="fr-FR" sz="2000" dirty="0" smtClean="0"/>
-              <a:t>Présentation des personnes dans l’arbre généalogique</a:t>
+              <a:t>Présentation des </a:t>
+            </a:r>
+            <a:r>
+              <a:rPr lang="fr-FR" sz="2000" dirty="0" smtClean="0"/>
+              <a:t>personnages </a:t>
+            </a:r>
+            <a:r>
+              <a:rPr lang="fr-FR" sz="2000" dirty="0" smtClean="0"/>
+              <a:t>dans l’arbre généalogique</a:t>
             </a:r>
           </a:p>
           <a:p>
@@ -3586,8 +3599,13 @@
             </a:pPr>
             <a:r>
               <a:rPr lang="fr-FR" sz="2000" dirty="0" smtClean="0"/>
-              <a:t>Choix des outils et technologies</a:t>
-            </a:r>
+              <a:t>Choix des outils et </a:t>
+            </a:r>
+            <a:r>
+              <a:rPr lang="fr-FR" sz="2000" dirty="0" smtClean="0"/>
+              <a:t>technologies de développement</a:t>
+            </a:r>
+            <a:endParaRPr lang="fr-FR" sz="2000" dirty="0" smtClean="0"/>
           </a:p>
           <a:p>
             <a:pPr marL="800100" lvl="1" indent="-342900">

</xml_diff>